<commit_message>
experimenting the presentation without the tree lengths
</commit_message>
<xml_diff>
--- a/Phylo_tree_pptx/Presentation.pptx
+++ b/Phylo_tree_pptx/Presentation.pptx
@@ -12016,1754 +12016,6 @@
           </p:nvSpPr>
           <p:spPr>
             <a:xfrm>
-              <a:off x="1715107" y="1929471"/>
-              <a:ext cx="158245" cy="45481"/>
-            </a:xfrm>
-            <a:prstGeom prst="rect">
-              <a:avLst/>
-            </a:prstGeom>
-            <a:noFill/>
-          </p:spPr>
-          <p:txBody>
-            <a:bodyPr lIns="0" rIns="0" tIns="0" bIns="0" anchorCtr="1" anchor="ctr" wrap="none"/>
-            <a:lstStyle/>
-            <a:p>
-              <a:pPr algn="l" marL="0" marR="0" indent="0">
-                <a:lnSpc>
-                  <a:spcPts val="497"/>
-                </a:lnSpc>
-                <a:spcBef>
-                  <a:spcPts val="0"/>
-                </a:spcBef>
-                <a:spcAft>
-                  <a:spcPts val="0"/>
-                </a:spcAft>
-              </a:pPr>
-              <a:r>
-                <a:rPr sz="497">
-                  <a:solidFill>
-                    <a:srgbClr val="000000">
-                      <a:alpha val="100000"/>
-                    </a:srgbClr>
-                  </a:solidFill>
-                  <a:latin typeface="Helvetica"/>
-                  <a:cs typeface="Helvetica"/>
-                </a:rPr>
-                <a:t>0.035</a:t>
-              </a:r>
-            </a:p>
-          </p:txBody>
-        </p:sp>
-        <p:sp>
-          <p:nvSpPr>
-            <p:cNvPr id="215" name="tx213"/>
-            <p:cNvSpPr/>
-            <p:nvPr/>
-          </p:nvSpPr>
-          <p:spPr>
-            <a:xfrm>
-              <a:off x="3098545" y="2119612"/>
-              <a:ext cx="158245" cy="45543"/>
-            </a:xfrm>
-            <a:prstGeom prst="rect">
-              <a:avLst/>
-            </a:prstGeom>
-            <a:noFill/>
-          </p:spPr>
-          <p:txBody>
-            <a:bodyPr lIns="0" rIns="0" tIns="0" bIns="0" anchorCtr="1" anchor="ctr" wrap="none"/>
-            <a:lstStyle/>
-            <a:p>
-              <a:pPr algn="l" marL="0" marR="0" indent="0">
-                <a:lnSpc>
-                  <a:spcPts val="497"/>
-                </a:lnSpc>
-                <a:spcBef>
-                  <a:spcPts val="0"/>
-                </a:spcBef>
-                <a:spcAft>
-                  <a:spcPts val="0"/>
-                </a:spcAft>
-              </a:pPr>
-              <a:r>
-                <a:rPr sz="497">
-                  <a:solidFill>
-                    <a:srgbClr val="000000">
-                      <a:alpha val="100000"/>
-                    </a:srgbClr>
-                  </a:solidFill>
-                  <a:latin typeface="Helvetica"/>
-                  <a:cs typeface="Helvetica"/>
-                </a:rPr>
-                <a:t>0.141</a:t>
-              </a:r>
-            </a:p>
-          </p:txBody>
-        </p:sp>
-        <p:sp>
-          <p:nvSpPr>
-            <p:cNvPr id="216" name="tx214"/>
-            <p:cNvSpPr/>
-            <p:nvPr/>
-          </p:nvSpPr>
-          <p:spPr>
-            <a:xfrm>
-              <a:off x="4418922" y="2309752"/>
-              <a:ext cx="158245" cy="45605"/>
-            </a:xfrm>
-            <a:prstGeom prst="rect">
-              <a:avLst/>
-            </a:prstGeom>
-            <a:noFill/>
-          </p:spPr>
-          <p:txBody>
-            <a:bodyPr lIns="0" rIns="0" tIns="0" bIns="0" anchorCtr="1" anchor="ctr" wrap="none"/>
-            <a:lstStyle/>
-            <a:p>
-              <a:pPr algn="l" marL="0" marR="0" indent="0">
-                <a:lnSpc>
-                  <a:spcPts val="497"/>
-                </a:lnSpc>
-                <a:spcBef>
-                  <a:spcPts val="0"/>
-                </a:spcBef>
-                <a:spcAft>
-                  <a:spcPts val="0"/>
-                </a:spcAft>
-              </a:pPr>
-              <a:r>
-                <a:rPr sz="497">
-                  <a:solidFill>
-                    <a:srgbClr val="000000">
-                      <a:alpha val="100000"/>
-                    </a:srgbClr>
-                  </a:solidFill>
-                  <a:latin typeface="Helvetica"/>
-                  <a:cs typeface="Helvetica"/>
-                </a:rPr>
-                <a:t>0.081</a:t>
-              </a:r>
-            </a:p>
-          </p:txBody>
-        </p:sp>
-        <p:sp>
-          <p:nvSpPr>
-            <p:cNvPr id="217" name="tx215"/>
-            <p:cNvSpPr/>
-            <p:nvPr/>
-          </p:nvSpPr>
-          <p:spPr>
-            <a:xfrm>
-              <a:off x="4227442" y="2214836"/>
-              <a:ext cx="158245" cy="45420"/>
-            </a:xfrm>
-            <a:prstGeom prst="rect">
-              <a:avLst/>
-            </a:prstGeom>
-            <a:noFill/>
-          </p:spPr>
-          <p:txBody>
-            <a:bodyPr lIns="0" rIns="0" tIns="0" bIns="0" anchorCtr="1" anchor="ctr" wrap="none"/>
-            <a:lstStyle/>
-            <a:p>
-              <a:pPr algn="l" marL="0" marR="0" indent="0">
-                <a:lnSpc>
-                  <a:spcPts val="497"/>
-                </a:lnSpc>
-                <a:spcBef>
-                  <a:spcPts val="0"/>
-                </a:spcBef>
-                <a:spcAft>
-                  <a:spcPts val="0"/>
-                </a:spcAft>
-              </a:pPr>
-              <a:r>
-                <a:rPr sz="497">
-                  <a:solidFill>
-                    <a:srgbClr val="000000">
-                      <a:alpha val="100000"/>
-                    </a:srgbClr>
-                  </a:solidFill>
-                  <a:latin typeface="Helvetica"/>
-                  <a:cs typeface="Helvetica"/>
-                </a:rPr>
-                <a:t>0.055</a:t>
-              </a:r>
-            </a:p>
-          </p:txBody>
-        </p:sp>
-        <p:sp>
-          <p:nvSpPr>
-            <p:cNvPr id="218" name="tx216"/>
-            <p:cNvSpPr/>
-            <p:nvPr/>
-          </p:nvSpPr>
-          <p:spPr>
-            <a:xfrm>
-              <a:off x="3320714" y="2404853"/>
-              <a:ext cx="158245" cy="45605"/>
-            </a:xfrm>
-            <a:prstGeom prst="rect">
-              <a:avLst/>
-            </a:prstGeom>
-            <a:noFill/>
-          </p:spPr>
-          <p:txBody>
-            <a:bodyPr lIns="0" rIns="0" tIns="0" bIns="0" anchorCtr="1" anchor="ctr" wrap="none"/>
-            <a:lstStyle/>
-            <a:p>
-              <a:pPr algn="l" marL="0" marR="0" indent="0">
-                <a:lnSpc>
-                  <a:spcPts val="497"/>
-                </a:lnSpc>
-                <a:spcBef>
-                  <a:spcPts val="0"/>
-                </a:spcBef>
-                <a:spcAft>
-                  <a:spcPts val="0"/>
-                </a:spcAft>
-              </a:pPr>
-              <a:r>
-                <a:rPr sz="497">
-                  <a:solidFill>
-                    <a:srgbClr val="000000">
-                      <a:alpha val="100000"/>
-                    </a:srgbClr>
-                  </a:solidFill>
-                  <a:latin typeface="Helvetica"/>
-                  <a:cs typeface="Helvetica"/>
-                </a:rPr>
-                <a:t>0.061</a:t>
-              </a:r>
-            </a:p>
-          </p:txBody>
-        </p:sp>
-        <p:sp>
-          <p:nvSpPr>
-            <p:cNvPr id="219" name="tx217"/>
-            <p:cNvSpPr/>
-            <p:nvPr/>
-          </p:nvSpPr>
-          <p:spPr>
-            <a:xfrm>
-              <a:off x="4215936" y="2499954"/>
-              <a:ext cx="158245" cy="45605"/>
-            </a:xfrm>
-            <a:prstGeom prst="rect">
-              <a:avLst/>
-            </a:prstGeom>
-            <a:noFill/>
-          </p:spPr>
-          <p:txBody>
-            <a:bodyPr lIns="0" rIns="0" tIns="0" bIns="0" anchorCtr="1" anchor="ctr" wrap="none"/>
-            <a:lstStyle/>
-            <a:p>
-              <a:pPr algn="l" marL="0" marR="0" indent="0">
-                <a:lnSpc>
-                  <a:spcPts val="497"/>
-                </a:lnSpc>
-                <a:spcBef>
-                  <a:spcPts val="0"/>
-                </a:spcBef>
-                <a:spcAft>
-                  <a:spcPts val="0"/>
-                </a:spcAft>
-              </a:pPr>
-              <a:r>
-                <a:rPr sz="497">
-                  <a:solidFill>
-                    <a:srgbClr val="000000">
-                      <a:alpha val="100000"/>
-                    </a:srgbClr>
-                  </a:solidFill>
-                  <a:latin typeface="Helvetica"/>
-                  <a:cs typeface="Helvetica"/>
-                </a:rPr>
-                <a:t>0.056</a:t>
-              </a:r>
-            </a:p>
-          </p:txBody>
-        </p:sp>
-        <p:sp>
-          <p:nvSpPr>
-            <p:cNvPr id="220" name="tx218"/>
-            <p:cNvSpPr/>
-            <p:nvPr/>
-          </p:nvSpPr>
-          <p:spPr>
-            <a:xfrm>
-              <a:off x="6834805" y="4211834"/>
-              <a:ext cx="158245" cy="45543"/>
-            </a:xfrm>
-            <a:prstGeom prst="rect">
-              <a:avLst/>
-            </a:prstGeom>
-            <a:noFill/>
-          </p:spPr>
-          <p:txBody>
-            <a:bodyPr lIns="0" rIns="0" tIns="0" bIns="0" anchorCtr="1" anchor="ctr" wrap="none"/>
-            <a:lstStyle/>
-            <a:p>
-              <a:pPr algn="l" marL="0" marR="0" indent="0">
-                <a:lnSpc>
-                  <a:spcPts val="497"/>
-                </a:lnSpc>
-                <a:spcBef>
-                  <a:spcPts val="0"/>
-                </a:spcBef>
-                <a:spcAft>
-                  <a:spcPts val="0"/>
-                </a:spcAft>
-              </a:pPr>
-              <a:r>
-                <a:rPr sz="497">
-                  <a:solidFill>
-                    <a:srgbClr val="000000">
-                      <a:alpha val="100000"/>
-                    </a:srgbClr>
-                  </a:solidFill>
-                  <a:latin typeface="Helvetica"/>
-                  <a:cs typeface="Helvetica"/>
-                </a:rPr>
-                <a:t>0.104</a:t>
-              </a:r>
-            </a:p>
-          </p:txBody>
-        </p:sp>
-        <p:sp>
-          <p:nvSpPr>
-            <p:cNvPr id="221" name="tx219"/>
-            <p:cNvSpPr/>
-            <p:nvPr/>
-          </p:nvSpPr>
-          <p:spPr>
-            <a:xfrm>
-              <a:off x="7353154" y="4306873"/>
-              <a:ext cx="158245" cy="45605"/>
-            </a:xfrm>
-            <a:prstGeom prst="rect">
-              <a:avLst/>
-            </a:prstGeom>
-            <a:noFill/>
-          </p:spPr>
-          <p:txBody>
-            <a:bodyPr lIns="0" rIns="0" tIns="0" bIns="0" anchorCtr="1" anchor="ctr" wrap="none"/>
-            <a:lstStyle/>
-            <a:p>
-              <a:pPr algn="l" marL="0" marR="0" indent="0">
-                <a:lnSpc>
-                  <a:spcPts val="497"/>
-                </a:lnSpc>
-                <a:spcBef>
-                  <a:spcPts val="0"/>
-                </a:spcBef>
-                <a:spcAft>
-                  <a:spcPts val="0"/>
-                </a:spcAft>
-              </a:pPr>
-              <a:r>
-                <a:rPr sz="497">
-                  <a:solidFill>
-                    <a:srgbClr val="000000">
-                      <a:alpha val="100000"/>
-                    </a:srgbClr>
-                  </a:solidFill>
-                  <a:latin typeface="Helvetica"/>
-                  <a:cs typeface="Helvetica"/>
-                </a:rPr>
-                <a:t>0.080</a:t>
-              </a:r>
-            </a:p>
-          </p:txBody>
-        </p:sp>
-        <p:sp>
-          <p:nvSpPr>
-            <p:cNvPr id="222" name="tx220"/>
-            <p:cNvSpPr/>
-            <p:nvPr/>
-          </p:nvSpPr>
-          <p:spPr>
-            <a:xfrm>
-              <a:off x="7174783" y="4592176"/>
-              <a:ext cx="158245" cy="45605"/>
-            </a:xfrm>
-            <a:prstGeom prst="rect">
-              <a:avLst/>
-            </a:prstGeom>
-            <a:noFill/>
-          </p:spPr>
-          <p:txBody>
-            <a:bodyPr lIns="0" rIns="0" tIns="0" bIns="0" anchorCtr="1" anchor="ctr" wrap="none"/>
-            <a:lstStyle/>
-            <a:p>
-              <a:pPr algn="l" marL="0" marR="0" indent="0">
-                <a:lnSpc>
-                  <a:spcPts val="497"/>
-                </a:lnSpc>
-                <a:spcBef>
-                  <a:spcPts val="0"/>
-                </a:spcBef>
-                <a:spcAft>
-                  <a:spcPts val="0"/>
-                </a:spcAft>
-              </a:pPr>
-              <a:r>
-                <a:rPr sz="497">
-                  <a:solidFill>
-                    <a:srgbClr val="000000">
-                      <a:alpha val="100000"/>
-                    </a:srgbClr>
-                  </a:solidFill>
-                  <a:latin typeface="Helvetica"/>
-                  <a:cs typeface="Helvetica"/>
-                </a:rPr>
-                <a:t>0.065</a:t>
-              </a:r>
-            </a:p>
-          </p:txBody>
-        </p:sp>
-        <p:sp>
-          <p:nvSpPr>
-            <p:cNvPr id="223" name="tx221"/>
-            <p:cNvSpPr/>
-            <p:nvPr/>
-          </p:nvSpPr>
-          <p:spPr>
-            <a:xfrm>
-              <a:off x="9039602" y="3546065"/>
-              <a:ext cx="158245" cy="45605"/>
-            </a:xfrm>
-            <a:prstGeom prst="rect">
-              <a:avLst/>
-            </a:prstGeom>
-            <a:noFill/>
-          </p:spPr>
-          <p:txBody>
-            <a:bodyPr lIns="0" rIns="0" tIns="0" bIns="0" anchorCtr="1" anchor="ctr" wrap="none"/>
-            <a:lstStyle/>
-            <a:p>
-              <a:pPr algn="l" marL="0" marR="0" indent="0">
-                <a:lnSpc>
-                  <a:spcPts val="497"/>
-                </a:lnSpc>
-                <a:spcBef>
-                  <a:spcPts val="0"/>
-                </a:spcBef>
-                <a:spcAft>
-                  <a:spcPts val="0"/>
-                </a:spcAft>
-              </a:pPr>
-              <a:r>
-                <a:rPr sz="497">
-                  <a:solidFill>
-                    <a:srgbClr val="000000">
-                      <a:alpha val="100000"/>
-                    </a:srgbClr>
-                  </a:solidFill>
-                  <a:latin typeface="Helvetica"/>
-                  <a:cs typeface="Helvetica"/>
-                </a:rPr>
-                <a:t>0.160</a:t>
-              </a:r>
-            </a:p>
-          </p:txBody>
-        </p:sp>
-        <p:sp>
-          <p:nvSpPr>
-            <p:cNvPr id="224" name="tx222"/>
-            <p:cNvSpPr/>
-            <p:nvPr/>
-          </p:nvSpPr>
-          <p:spPr>
-            <a:xfrm>
-              <a:off x="8854009" y="3641197"/>
-              <a:ext cx="158245" cy="45574"/>
-            </a:xfrm>
-            <a:prstGeom prst="rect">
-              <a:avLst/>
-            </a:prstGeom>
-            <a:noFill/>
-          </p:spPr>
-          <p:txBody>
-            <a:bodyPr lIns="0" rIns="0" tIns="0" bIns="0" anchorCtr="1" anchor="ctr" wrap="none"/>
-            <a:lstStyle/>
-            <a:p>
-              <a:pPr algn="l" marL="0" marR="0" indent="0">
-                <a:lnSpc>
-                  <a:spcPts val="497"/>
-                </a:lnSpc>
-                <a:spcBef>
-                  <a:spcPts val="0"/>
-                </a:spcBef>
-                <a:spcAft>
-                  <a:spcPts val="0"/>
-                </a:spcAft>
-              </a:pPr>
-              <a:r>
-                <a:rPr sz="497">
-                  <a:solidFill>
-                    <a:srgbClr val="000000">
-                      <a:alpha val="100000"/>
-                    </a:srgbClr>
-                  </a:solidFill>
-                  <a:latin typeface="Helvetica"/>
-                  <a:cs typeface="Helvetica"/>
-                </a:rPr>
-                <a:t>0.102</a:t>
-              </a:r>
-            </a:p>
-          </p:txBody>
-        </p:sp>
-        <p:sp>
-          <p:nvSpPr>
-            <p:cNvPr id="225" name="tx223"/>
-            <p:cNvSpPr/>
-            <p:nvPr/>
-          </p:nvSpPr>
-          <p:spPr>
-            <a:xfrm>
-              <a:off x="9409207" y="3831553"/>
-              <a:ext cx="158245" cy="45420"/>
-            </a:xfrm>
-            <a:prstGeom prst="rect">
-              <a:avLst/>
-            </a:prstGeom>
-            <a:noFill/>
-          </p:spPr>
-          <p:txBody>
-            <a:bodyPr lIns="0" rIns="0" tIns="0" bIns="0" anchorCtr="1" anchor="ctr" wrap="none"/>
-            <a:lstStyle/>
-            <a:p>
-              <a:pPr algn="l" marL="0" marR="0" indent="0">
-                <a:lnSpc>
-                  <a:spcPts val="497"/>
-                </a:lnSpc>
-                <a:spcBef>
-                  <a:spcPts val="0"/>
-                </a:spcBef>
-                <a:spcAft>
-                  <a:spcPts val="0"/>
-                </a:spcAft>
-              </a:pPr>
-              <a:r>
-                <a:rPr sz="497">
-                  <a:solidFill>
-                    <a:srgbClr val="000000">
-                      <a:alpha val="100000"/>
-                    </a:srgbClr>
-                  </a:solidFill>
-                  <a:latin typeface="Helvetica"/>
-                  <a:cs typeface="Helvetica"/>
-                </a:rPr>
-                <a:t>0.050</a:t>
-              </a:r>
-            </a:p>
-          </p:txBody>
-        </p:sp>
-        <p:sp>
-          <p:nvSpPr>
-            <p:cNvPr id="226" name="tx224"/>
-            <p:cNvSpPr/>
-            <p:nvPr/>
-          </p:nvSpPr>
-          <p:spPr>
-            <a:xfrm>
-              <a:off x="9476954" y="3926469"/>
-              <a:ext cx="158245" cy="45605"/>
-            </a:xfrm>
-            <a:prstGeom prst="rect">
-              <a:avLst/>
-            </a:prstGeom>
-            <a:noFill/>
-          </p:spPr>
-          <p:txBody>
-            <a:bodyPr lIns="0" rIns="0" tIns="0" bIns="0" anchorCtr="1" anchor="ctr" wrap="none"/>
-            <a:lstStyle/>
-            <a:p>
-              <a:pPr algn="l" marL="0" marR="0" indent="0">
-                <a:lnSpc>
-                  <a:spcPts val="497"/>
-                </a:lnSpc>
-                <a:spcBef>
-                  <a:spcPts val="0"/>
-                </a:spcBef>
-                <a:spcAft>
-                  <a:spcPts val="0"/>
-                </a:spcAft>
-              </a:pPr>
-              <a:r>
-                <a:rPr sz="497">
-                  <a:solidFill>
-                    <a:srgbClr val="000000">
-                      <a:alpha val="100000"/>
-                    </a:srgbClr>
-                  </a:solidFill>
-                  <a:latin typeface="Helvetica"/>
-                  <a:cs typeface="Helvetica"/>
-                </a:rPr>
-                <a:t>0.076</a:t>
-              </a:r>
-            </a:p>
-          </p:txBody>
-        </p:sp>
-        <p:sp>
-          <p:nvSpPr>
-            <p:cNvPr id="227" name="tx225"/>
-            <p:cNvSpPr/>
-            <p:nvPr/>
-          </p:nvSpPr>
-          <p:spPr>
-            <a:xfrm>
-              <a:off x="9798411" y="4021755"/>
-              <a:ext cx="158245" cy="45420"/>
-            </a:xfrm>
-            <a:prstGeom prst="rect">
-              <a:avLst/>
-            </a:prstGeom>
-            <a:noFill/>
-          </p:spPr>
-          <p:txBody>
-            <a:bodyPr lIns="0" rIns="0" tIns="0" bIns="0" anchorCtr="1" anchor="ctr" wrap="none"/>
-            <a:lstStyle/>
-            <a:p>
-              <a:pPr algn="l" marL="0" marR="0" indent="0">
-                <a:lnSpc>
-                  <a:spcPts val="497"/>
-                </a:lnSpc>
-                <a:spcBef>
-                  <a:spcPts val="0"/>
-                </a:spcBef>
-                <a:spcAft>
-                  <a:spcPts val="0"/>
-                </a:spcAft>
-              </a:pPr>
-              <a:r>
-                <a:rPr sz="497">
-                  <a:solidFill>
-                    <a:srgbClr val="000000">
-                      <a:alpha val="100000"/>
-                    </a:srgbClr>
-                  </a:solidFill>
-                  <a:latin typeface="Helvetica"/>
-                  <a:cs typeface="Helvetica"/>
-                </a:rPr>
-                <a:t>0.110</a:t>
-              </a:r>
-            </a:p>
-          </p:txBody>
-        </p:sp>
-        <p:sp>
-          <p:nvSpPr>
-            <p:cNvPr id="228" name="tx226"/>
-            <p:cNvSpPr/>
-            <p:nvPr/>
-          </p:nvSpPr>
-          <p:spPr>
-            <a:xfrm>
-              <a:off x="7183290" y="3165784"/>
-              <a:ext cx="158245" cy="45481"/>
-            </a:xfrm>
-            <a:prstGeom prst="rect">
-              <a:avLst/>
-            </a:prstGeom>
-            <a:noFill/>
-          </p:spPr>
-          <p:txBody>
-            <a:bodyPr lIns="0" rIns="0" tIns="0" bIns="0" anchorCtr="1" anchor="ctr" wrap="none"/>
-            <a:lstStyle/>
-            <a:p>
-              <a:pPr algn="l" marL="0" marR="0" indent="0">
-                <a:lnSpc>
-                  <a:spcPts val="497"/>
-                </a:lnSpc>
-                <a:spcBef>
-                  <a:spcPts val="0"/>
-                </a:spcBef>
-                <a:spcAft>
-                  <a:spcPts val="0"/>
-                </a:spcAft>
-              </a:pPr>
-              <a:r>
-                <a:rPr sz="497">
-                  <a:solidFill>
-                    <a:srgbClr val="000000">
-                      <a:alpha val="100000"/>
-                    </a:srgbClr>
-                  </a:solidFill>
-                  <a:latin typeface="Helvetica"/>
-                  <a:cs typeface="Helvetica"/>
-                </a:rPr>
-                <a:t>0.130</a:t>
-              </a:r>
-            </a:p>
-          </p:txBody>
-        </p:sp>
-        <p:sp>
-          <p:nvSpPr>
-            <p:cNvPr id="229" name="tx227"/>
-            <p:cNvSpPr/>
-            <p:nvPr/>
-          </p:nvSpPr>
-          <p:spPr>
-            <a:xfrm>
-              <a:off x="6838702" y="3260824"/>
-              <a:ext cx="158245" cy="45543"/>
-            </a:xfrm>
-            <a:prstGeom prst="rect">
-              <a:avLst/>
-            </a:prstGeom>
-            <a:noFill/>
-          </p:spPr>
-          <p:txBody>
-            <a:bodyPr lIns="0" rIns="0" tIns="0" bIns="0" anchorCtr="1" anchor="ctr" wrap="none"/>
-            <a:lstStyle/>
-            <a:p>
-              <a:pPr algn="l" marL="0" marR="0" indent="0">
-                <a:lnSpc>
-                  <a:spcPts val="497"/>
-                </a:lnSpc>
-                <a:spcBef>
-                  <a:spcPts val="0"/>
-                </a:spcBef>
-                <a:spcAft>
-                  <a:spcPts val="0"/>
-                </a:spcAft>
-              </a:pPr>
-              <a:r>
-                <a:rPr sz="497">
-                  <a:solidFill>
-                    <a:srgbClr val="000000">
-                      <a:alpha val="100000"/>
-                    </a:srgbClr>
-                  </a:solidFill>
-                  <a:latin typeface="Helvetica"/>
-                  <a:cs typeface="Helvetica"/>
-                </a:rPr>
-                <a:t>0.074</a:t>
-              </a:r>
-            </a:p>
-          </p:txBody>
-        </p:sp>
-        <p:sp>
-          <p:nvSpPr>
-            <p:cNvPr id="230" name="tx228"/>
-            <p:cNvSpPr/>
-            <p:nvPr/>
-          </p:nvSpPr>
-          <p:spPr>
-            <a:xfrm>
-              <a:off x="7546267" y="3450964"/>
-              <a:ext cx="158245" cy="45605"/>
-            </a:xfrm>
-            <a:prstGeom prst="rect">
-              <a:avLst/>
-            </a:prstGeom>
-            <a:noFill/>
-          </p:spPr>
-          <p:txBody>
-            <a:bodyPr lIns="0" rIns="0" tIns="0" bIns="0" anchorCtr="1" anchor="ctr" wrap="none"/>
-            <a:lstStyle/>
-            <a:p>
-              <a:pPr algn="l" marL="0" marR="0" indent="0">
-                <a:lnSpc>
-                  <a:spcPts val="497"/>
-                </a:lnSpc>
-                <a:spcBef>
-                  <a:spcPts val="0"/>
-                </a:spcBef>
-                <a:spcAft>
-                  <a:spcPts val="0"/>
-                </a:spcAft>
-              </a:pPr>
-              <a:r>
-                <a:rPr sz="497">
-                  <a:solidFill>
-                    <a:srgbClr val="000000">
-                      <a:alpha val="100000"/>
-                    </a:srgbClr>
-                  </a:solidFill>
-                  <a:latin typeface="Helvetica"/>
-                  <a:cs typeface="Helvetica"/>
-                </a:rPr>
-                <a:t>0.066</a:t>
-              </a:r>
-            </a:p>
-          </p:txBody>
-        </p:sp>
-        <p:sp>
-          <p:nvSpPr>
-            <p:cNvPr id="231" name="tx229"/>
-            <p:cNvSpPr/>
-            <p:nvPr/>
-          </p:nvSpPr>
-          <p:spPr>
-            <a:xfrm>
-              <a:off x="7307247" y="3355925"/>
-              <a:ext cx="158245" cy="45543"/>
-            </a:xfrm>
-            <a:prstGeom prst="rect">
-              <a:avLst/>
-            </a:prstGeom>
-            <a:noFill/>
-          </p:spPr>
-          <p:txBody>
-            <a:bodyPr lIns="0" rIns="0" tIns="0" bIns="0" anchorCtr="1" anchor="ctr" wrap="none"/>
-            <a:lstStyle/>
-            <a:p>
-              <a:pPr algn="l" marL="0" marR="0" indent="0">
-                <a:lnSpc>
-                  <a:spcPts val="497"/>
-                </a:lnSpc>
-                <a:spcBef>
-                  <a:spcPts val="0"/>
-                </a:spcBef>
-                <a:spcAft>
-                  <a:spcPts val="0"/>
-                </a:spcAft>
-              </a:pPr>
-              <a:r>
-                <a:rPr sz="497">
-                  <a:solidFill>
-                    <a:srgbClr val="000000">
-                      <a:alpha val="100000"/>
-                    </a:srgbClr>
-                  </a:solidFill>
-                  <a:latin typeface="Helvetica"/>
-                  <a:cs typeface="Helvetica"/>
-                </a:rPr>
-                <a:t>0.034</a:t>
-              </a:r>
-            </a:p>
-          </p:txBody>
-        </p:sp>
-        <p:sp>
-          <p:nvSpPr>
-            <p:cNvPr id="232" name="tx230"/>
-            <p:cNvSpPr/>
-            <p:nvPr/>
-          </p:nvSpPr>
-          <p:spPr>
-            <a:xfrm>
-              <a:off x="7652296" y="3070560"/>
-              <a:ext cx="158245" cy="45605"/>
-            </a:xfrm>
-            <a:prstGeom prst="rect">
-              <a:avLst/>
-            </a:prstGeom>
-            <a:noFill/>
-          </p:spPr>
-          <p:txBody>
-            <a:bodyPr lIns="0" rIns="0" tIns="0" bIns="0" anchorCtr="1" anchor="ctr" wrap="none"/>
-            <a:lstStyle/>
-            <a:p>
-              <a:pPr algn="l" marL="0" marR="0" indent="0">
-                <a:lnSpc>
-                  <a:spcPts val="497"/>
-                </a:lnSpc>
-                <a:spcBef>
-                  <a:spcPts val="0"/>
-                </a:spcBef>
-                <a:spcAft>
-                  <a:spcPts val="0"/>
-                </a:spcAft>
-              </a:pPr>
-              <a:r>
-                <a:rPr sz="497">
-                  <a:solidFill>
-                    <a:srgbClr val="000000">
-                      <a:alpha val="100000"/>
-                    </a:srgbClr>
-                  </a:solidFill>
-                  <a:latin typeface="Helvetica"/>
-                  <a:cs typeface="Helvetica"/>
-                </a:rPr>
-                <a:t>0.229</a:t>
-              </a:r>
-            </a:p>
-          </p:txBody>
-        </p:sp>
-        <p:sp>
-          <p:nvSpPr>
-            <p:cNvPr id="233" name="tx231"/>
-            <p:cNvSpPr/>
-            <p:nvPr/>
-          </p:nvSpPr>
-          <p:spPr>
-            <a:xfrm>
-              <a:off x="6893702" y="2975428"/>
-              <a:ext cx="158245" cy="45636"/>
-            </a:xfrm>
-            <a:prstGeom prst="rect">
-              <a:avLst/>
-            </a:prstGeom>
-            <a:noFill/>
-          </p:spPr>
-          <p:txBody>
-            <a:bodyPr lIns="0" rIns="0" tIns="0" bIns="0" anchorCtr="1" anchor="ctr" wrap="none"/>
-            <a:lstStyle/>
-            <a:p>
-              <a:pPr algn="l" marL="0" marR="0" indent="0">
-                <a:lnSpc>
-                  <a:spcPts val="497"/>
-                </a:lnSpc>
-                <a:spcBef>
-                  <a:spcPts val="0"/>
-                </a:spcBef>
-                <a:spcAft>
-                  <a:spcPts val="0"/>
-                </a:spcAft>
-              </a:pPr>
-              <a:r>
-                <a:rPr sz="497">
-                  <a:solidFill>
-                    <a:srgbClr val="000000">
-                      <a:alpha val="100000"/>
-                    </a:srgbClr>
-                  </a:solidFill>
-                  <a:latin typeface="Helvetica"/>
-                  <a:cs typeface="Helvetica"/>
-                </a:rPr>
-                <a:t>0.096</a:t>
-              </a:r>
-            </a:p>
-          </p:txBody>
-        </p:sp>
-        <p:sp>
-          <p:nvSpPr>
-            <p:cNvPr id="234" name="tx232"/>
-            <p:cNvSpPr/>
-            <p:nvPr/>
-          </p:nvSpPr>
-          <p:spPr>
-            <a:xfrm>
-              <a:off x="6940737" y="2880389"/>
-              <a:ext cx="158245" cy="45574"/>
-            </a:xfrm>
-            <a:prstGeom prst="rect">
-              <a:avLst/>
-            </a:prstGeom>
-            <a:noFill/>
-          </p:spPr>
-          <p:txBody>
-            <a:bodyPr lIns="0" rIns="0" tIns="0" bIns="0" anchorCtr="1" anchor="ctr" wrap="none"/>
-            <a:lstStyle/>
-            <a:p>
-              <a:pPr algn="l" marL="0" marR="0" indent="0">
-                <a:lnSpc>
-                  <a:spcPts val="497"/>
-                </a:lnSpc>
-                <a:spcBef>
-                  <a:spcPts val="0"/>
-                </a:spcBef>
-                <a:spcAft>
-                  <a:spcPts val="0"/>
-                </a:spcAft>
-              </a:pPr>
-              <a:r>
-                <a:rPr sz="497">
-                  <a:solidFill>
-                    <a:srgbClr val="000000">
-                      <a:alpha val="100000"/>
-                    </a:srgbClr>
-                  </a:solidFill>
-                  <a:latin typeface="Helvetica"/>
-                  <a:cs typeface="Helvetica"/>
-                </a:rPr>
-                <a:t>0.102</a:t>
-              </a:r>
-            </a:p>
-          </p:txBody>
-        </p:sp>
-        <p:sp>
-          <p:nvSpPr>
-            <p:cNvPr id="235" name="tx233"/>
-            <p:cNvSpPr/>
-            <p:nvPr/>
-          </p:nvSpPr>
-          <p:spPr>
-            <a:xfrm>
-              <a:off x="5568560" y="2595178"/>
-              <a:ext cx="158245" cy="45481"/>
-            </a:xfrm>
-            <a:prstGeom prst="rect">
-              <a:avLst/>
-            </a:prstGeom>
-            <a:noFill/>
-          </p:spPr>
-          <p:txBody>
-            <a:bodyPr lIns="0" rIns="0" tIns="0" bIns="0" anchorCtr="1" anchor="ctr" wrap="none"/>
-            <a:lstStyle/>
-            <a:p>
-              <a:pPr algn="l" marL="0" marR="0" indent="0">
-                <a:lnSpc>
-                  <a:spcPts val="497"/>
-                </a:lnSpc>
-                <a:spcBef>
-                  <a:spcPts val="0"/>
-                </a:spcBef>
-                <a:spcAft>
-                  <a:spcPts val="0"/>
-                </a:spcAft>
-              </a:pPr>
-              <a:r>
-                <a:rPr sz="497">
-                  <a:solidFill>
-                    <a:srgbClr val="000000">
-                      <a:alpha val="100000"/>
-                    </a:srgbClr>
-                  </a:solidFill>
-                  <a:latin typeface="Helvetica"/>
-                  <a:cs typeface="Helvetica"/>
-                </a:rPr>
-                <a:t>0.035</a:t>
-              </a:r>
-            </a:p>
-          </p:txBody>
-        </p:sp>
-        <p:sp>
-          <p:nvSpPr>
-            <p:cNvPr id="236" name="tx234"/>
-            <p:cNvSpPr/>
-            <p:nvPr/>
-          </p:nvSpPr>
-          <p:spPr>
-            <a:xfrm>
-              <a:off x="6391254" y="2785442"/>
-              <a:ext cx="158245" cy="45420"/>
-            </a:xfrm>
-            <a:prstGeom prst="rect">
-              <a:avLst/>
-            </a:prstGeom>
-            <a:noFill/>
-          </p:spPr>
-          <p:txBody>
-            <a:bodyPr lIns="0" rIns="0" tIns="0" bIns="0" anchorCtr="1" anchor="ctr" wrap="none"/>
-            <a:lstStyle/>
-            <a:p>
-              <a:pPr algn="l" marL="0" marR="0" indent="0">
-                <a:lnSpc>
-                  <a:spcPts val="497"/>
-                </a:lnSpc>
-                <a:spcBef>
-                  <a:spcPts val="0"/>
-                </a:spcBef>
-                <a:spcAft>
-                  <a:spcPts val="0"/>
-                </a:spcAft>
-              </a:pPr>
-              <a:r>
-                <a:rPr sz="497">
-                  <a:solidFill>
-                    <a:srgbClr val="000000">
-                      <a:alpha val="100000"/>
-                    </a:srgbClr>
-                  </a:solidFill>
-                  <a:latin typeface="Helvetica"/>
-                  <a:cs typeface="Helvetica"/>
-                </a:rPr>
-                <a:t>0.115</a:t>
-              </a:r>
-            </a:p>
-          </p:txBody>
-        </p:sp>
-        <p:sp>
-          <p:nvSpPr>
-            <p:cNvPr id="237" name="tx235"/>
-            <p:cNvSpPr/>
-            <p:nvPr/>
-          </p:nvSpPr>
-          <p:spPr>
-            <a:xfrm>
-              <a:off x="6082343" y="2690218"/>
-              <a:ext cx="158245" cy="45543"/>
-            </a:xfrm>
-            <a:prstGeom prst="rect">
-              <a:avLst/>
-            </a:prstGeom>
-            <a:noFill/>
-          </p:spPr>
-          <p:txBody>
-            <a:bodyPr lIns="0" rIns="0" tIns="0" bIns="0" anchorCtr="1" anchor="ctr" wrap="none"/>
-            <a:lstStyle/>
-            <a:p>
-              <a:pPr algn="l" marL="0" marR="0" indent="0">
-                <a:lnSpc>
-                  <a:spcPts val="497"/>
-                </a:lnSpc>
-                <a:spcBef>
-                  <a:spcPts val="0"/>
-                </a:spcBef>
-                <a:spcAft>
-                  <a:spcPts val="0"/>
-                </a:spcAft>
-              </a:pPr>
-              <a:r>
-                <a:rPr sz="497">
-                  <a:solidFill>
-                    <a:srgbClr val="000000">
-                      <a:alpha val="100000"/>
-                    </a:srgbClr>
-                  </a:solidFill>
-                  <a:latin typeface="Helvetica"/>
-                  <a:cs typeface="Helvetica"/>
-                </a:rPr>
-                <a:t>0.074</a:t>
-              </a:r>
-            </a:p>
-          </p:txBody>
-        </p:sp>
-        <p:sp>
-          <p:nvSpPr>
-            <p:cNvPr id="238" name="tx236"/>
-            <p:cNvSpPr/>
-            <p:nvPr/>
-          </p:nvSpPr>
-          <p:spPr>
-            <a:xfrm>
-              <a:off x="1752573" y="2287083"/>
-              <a:ext cx="158245" cy="45543"/>
-            </a:xfrm>
-            <a:prstGeom prst="rect">
-              <a:avLst/>
-            </a:prstGeom>
-            <a:noFill/>
-          </p:spPr>
-          <p:txBody>
-            <a:bodyPr lIns="0" rIns="0" tIns="0" bIns="0" anchorCtr="1" anchor="ctr" wrap="none"/>
-            <a:lstStyle/>
-            <a:p>
-              <a:pPr algn="l" marL="0" marR="0" indent="0">
-                <a:lnSpc>
-                  <a:spcPts val="497"/>
-                </a:lnSpc>
-                <a:spcBef>
-                  <a:spcPts val="0"/>
-                </a:spcBef>
-                <a:spcAft>
-                  <a:spcPts val="0"/>
-                </a:spcAft>
-              </a:pPr>
-              <a:r>
-                <a:rPr sz="497">
-                  <a:solidFill>
-                    <a:srgbClr val="000000">
-                      <a:alpha val="100000"/>
-                    </a:srgbClr>
-                  </a:solidFill>
-                  <a:latin typeface="Helvetica"/>
-                  <a:cs typeface="Helvetica"/>
-                </a:rPr>
-                <a:t>0.040</a:t>
-              </a:r>
-            </a:p>
-          </p:txBody>
-        </p:sp>
-        <p:sp>
-          <p:nvSpPr>
-            <p:cNvPr id="239" name="tx237"/>
-            <p:cNvSpPr/>
-            <p:nvPr/>
-          </p:nvSpPr>
-          <p:spPr>
-            <a:xfrm>
-              <a:off x="2307170" y="2454553"/>
-              <a:ext cx="158245" cy="45543"/>
-            </a:xfrm>
-            <a:prstGeom prst="rect">
-              <a:avLst/>
-            </a:prstGeom>
-            <a:noFill/>
-          </p:spPr>
-          <p:txBody>
-            <a:bodyPr lIns="0" rIns="0" tIns="0" bIns="0" anchorCtr="1" anchor="ctr" wrap="none"/>
-            <a:lstStyle/>
-            <a:p>
-              <a:pPr algn="l" marL="0" marR="0" indent="0">
-                <a:lnSpc>
-                  <a:spcPts val="497"/>
-                </a:lnSpc>
-                <a:spcBef>
-                  <a:spcPts val="0"/>
-                </a:spcBef>
-                <a:spcAft>
-                  <a:spcPts val="0"/>
-                </a:spcAft>
-              </a:pPr>
-              <a:r>
-                <a:rPr sz="497">
-                  <a:solidFill>
-                    <a:srgbClr val="000000">
-                      <a:alpha val="100000"/>
-                    </a:srgbClr>
-                  </a:solidFill>
-                  <a:latin typeface="Helvetica"/>
-                  <a:cs typeface="Helvetica"/>
-                </a:rPr>
-                <a:t>0.034</a:t>
-              </a:r>
-            </a:p>
-          </p:txBody>
-        </p:sp>
-        <p:sp>
-          <p:nvSpPr>
-            <p:cNvPr id="240" name="tx238"/>
-            <p:cNvSpPr/>
-            <p:nvPr/>
-          </p:nvSpPr>
-          <p:spPr>
-            <a:xfrm>
-              <a:off x="3190685" y="2262201"/>
-              <a:ext cx="158245" cy="45605"/>
-            </a:xfrm>
-            <a:prstGeom prst="rect">
-              <a:avLst/>
-            </a:prstGeom>
-            <a:noFill/>
-          </p:spPr>
-          <p:txBody>
-            <a:bodyPr lIns="0" rIns="0" tIns="0" bIns="0" anchorCtr="1" anchor="ctr" wrap="none"/>
-            <a:lstStyle/>
-            <a:p>
-              <a:pPr algn="l" marL="0" marR="0" indent="0">
-                <a:lnSpc>
-                  <a:spcPts val="497"/>
-                </a:lnSpc>
-                <a:spcBef>
-                  <a:spcPts val="0"/>
-                </a:spcBef>
-                <a:spcAft>
-                  <a:spcPts val="0"/>
-                </a:spcAft>
-              </a:pPr>
-              <a:r>
-                <a:rPr sz="497">
-                  <a:solidFill>
-                    <a:srgbClr val="000000">
-                      <a:alpha val="100000"/>
-                    </a:srgbClr>
-                  </a:solidFill>
-                  <a:latin typeface="Helvetica"/>
-                  <a:cs typeface="Helvetica"/>
-                </a:rPr>
-                <a:t>0.085</a:t>
-              </a:r>
-            </a:p>
-          </p:txBody>
-        </p:sp>
-        <p:sp>
-          <p:nvSpPr>
-            <p:cNvPr id="241" name="tx239"/>
-            <p:cNvSpPr/>
-            <p:nvPr/>
-          </p:nvSpPr>
-          <p:spPr>
-            <a:xfrm>
-              <a:off x="3332242" y="2888711"/>
-              <a:ext cx="158245" cy="45605"/>
-            </a:xfrm>
-            <a:prstGeom prst="rect">
-              <a:avLst/>
-            </a:prstGeom>
-            <a:noFill/>
-          </p:spPr>
-          <p:txBody>
-            <a:bodyPr lIns="0" rIns="0" tIns="0" bIns="0" anchorCtr="1" anchor="ctr" wrap="none"/>
-            <a:lstStyle/>
-            <a:p>
-              <a:pPr algn="l" marL="0" marR="0" indent="0">
-                <a:lnSpc>
-                  <a:spcPts val="497"/>
-                </a:lnSpc>
-                <a:spcBef>
-                  <a:spcPts val="0"/>
-                </a:spcBef>
-                <a:spcAft>
-                  <a:spcPts val="0"/>
-                </a:spcAft>
-              </a:pPr>
-              <a:r>
-                <a:rPr sz="497">
-                  <a:solidFill>
-                    <a:srgbClr val="000000">
-                      <a:alpha val="100000"/>
-                    </a:srgbClr>
-                  </a:solidFill>
-                  <a:latin typeface="Helvetica"/>
-                  <a:cs typeface="Helvetica"/>
-                </a:rPr>
-                <a:t>0.063</a:t>
-              </a:r>
-            </a:p>
-          </p:txBody>
-        </p:sp>
-        <p:sp>
-          <p:nvSpPr>
-            <p:cNvPr id="242" name="tx240"/>
-            <p:cNvSpPr/>
-            <p:nvPr/>
-          </p:nvSpPr>
-          <p:spPr>
-            <a:xfrm>
-              <a:off x="4341711" y="3277591"/>
-              <a:ext cx="158245" cy="45481"/>
-            </a:xfrm>
-            <a:prstGeom prst="rect">
-              <a:avLst/>
-            </a:prstGeom>
-            <a:noFill/>
-          </p:spPr>
-          <p:txBody>
-            <a:bodyPr lIns="0" rIns="0" tIns="0" bIns="0" anchorCtr="1" anchor="ctr" wrap="none"/>
-            <a:lstStyle/>
-            <a:p>
-              <a:pPr algn="l" marL="0" marR="0" indent="0">
-                <a:lnSpc>
-                  <a:spcPts val="497"/>
-                </a:lnSpc>
-                <a:spcBef>
-                  <a:spcPts val="0"/>
-                </a:spcBef>
-                <a:spcAft>
-                  <a:spcPts val="0"/>
-                </a:spcAft>
-              </a:pPr>
-              <a:r>
-                <a:rPr sz="497">
-                  <a:solidFill>
-                    <a:srgbClr val="000000">
-                      <a:alpha val="100000"/>
-                    </a:srgbClr>
-                  </a:solidFill>
-                  <a:latin typeface="Helvetica"/>
-                  <a:cs typeface="Helvetica"/>
-                </a:rPr>
-                <a:t>0.073</a:t>
-              </a:r>
-            </a:p>
-          </p:txBody>
-        </p:sp>
-        <p:sp>
-          <p:nvSpPr>
-            <p:cNvPr id="243" name="tx241"/>
-            <p:cNvSpPr/>
-            <p:nvPr/>
-          </p:nvSpPr>
-          <p:spPr>
-            <a:xfrm>
-              <a:off x="5683296" y="4427374"/>
-              <a:ext cx="158245" cy="45420"/>
-            </a:xfrm>
-            <a:prstGeom prst="rect">
-              <a:avLst/>
-            </a:prstGeom>
-            <a:noFill/>
-          </p:spPr>
-          <p:txBody>
-            <a:bodyPr lIns="0" rIns="0" tIns="0" bIns="0" anchorCtr="1" anchor="ctr" wrap="none"/>
-            <a:lstStyle/>
-            <a:p>
-              <a:pPr algn="l" marL="0" marR="0" indent="0">
-                <a:lnSpc>
-                  <a:spcPts val="497"/>
-                </a:lnSpc>
-                <a:spcBef>
-                  <a:spcPts val="0"/>
-                </a:spcBef>
-                <a:spcAft>
-                  <a:spcPts val="0"/>
-                </a:spcAft>
-              </a:pPr>
-              <a:r>
-                <a:rPr sz="497">
-                  <a:solidFill>
-                    <a:srgbClr val="000000">
-                      <a:alpha val="100000"/>
-                    </a:srgbClr>
-                  </a:solidFill>
-                  <a:latin typeface="Helvetica"/>
-                  <a:cs typeface="Helvetica"/>
-                </a:rPr>
-                <a:t>0.051</a:t>
-              </a:r>
-            </a:p>
-          </p:txBody>
-        </p:sp>
-        <p:sp>
-          <p:nvSpPr>
-            <p:cNvPr id="244" name="tx242"/>
-            <p:cNvSpPr/>
-            <p:nvPr/>
-          </p:nvSpPr>
-          <p:spPr>
-            <a:xfrm>
-              <a:off x="7100445" y="4449524"/>
-              <a:ext cx="158245" cy="45605"/>
-            </a:xfrm>
-            <a:prstGeom prst="rect">
-              <a:avLst/>
-            </a:prstGeom>
-            <a:noFill/>
-          </p:spPr>
-          <p:txBody>
-            <a:bodyPr lIns="0" rIns="0" tIns="0" bIns="0" anchorCtr="1" anchor="ctr" wrap="none"/>
-            <a:lstStyle/>
-            <a:p>
-              <a:pPr algn="l" marL="0" marR="0" indent="0">
-                <a:lnSpc>
-                  <a:spcPts val="497"/>
-                </a:lnSpc>
-                <a:spcBef>
-                  <a:spcPts val="0"/>
-                </a:spcBef>
-                <a:spcAft>
-                  <a:spcPts val="0"/>
-                </a:spcAft>
-              </a:pPr>
-              <a:r>
-                <a:rPr sz="497">
-                  <a:solidFill>
-                    <a:srgbClr val="000000">
-                      <a:alpha val="100000"/>
-                    </a:srgbClr>
-                  </a:solidFill>
-                  <a:latin typeface="Helvetica"/>
-                  <a:cs typeface="Helvetica"/>
-                </a:rPr>
-                <a:t>0.046</a:t>
-              </a:r>
-            </a:p>
-          </p:txBody>
-        </p:sp>
-        <p:sp>
-          <p:nvSpPr>
-            <p:cNvPr id="245" name="tx243"/>
-            <p:cNvSpPr/>
-            <p:nvPr/>
-          </p:nvSpPr>
-          <p:spPr>
-            <a:xfrm>
-              <a:off x="6816907" y="5138666"/>
-              <a:ext cx="158245" cy="45574"/>
-            </a:xfrm>
-            <a:prstGeom prst="rect">
-              <a:avLst/>
-            </a:prstGeom>
-            <a:noFill/>
-          </p:spPr>
-          <p:txBody>
-            <a:bodyPr lIns="0" rIns="0" tIns="0" bIns="0" anchorCtr="1" anchor="ctr" wrap="none"/>
-            <a:lstStyle/>
-            <a:p>
-              <a:pPr algn="l" marL="0" marR="0" indent="0">
-                <a:lnSpc>
-                  <a:spcPts val="497"/>
-                </a:lnSpc>
-                <a:spcBef>
-                  <a:spcPts val="0"/>
-                </a:spcBef>
-                <a:spcAft>
-                  <a:spcPts val="0"/>
-                </a:spcAft>
-              </a:pPr>
-              <a:r>
-                <a:rPr sz="497">
-                  <a:solidFill>
-                    <a:srgbClr val="000000">
-                      <a:alpha val="100000"/>
-                    </a:srgbClr>
-                  </a:solidFill>
-                  <a:latin typeface="Helvetica"/>
-                  <a:cs typeface="Helvetica"/>
-                </a:rPr>
-                <a:t>0.032</a:t>
-              </a:r>
-            </a:p>
-          </p:txBody>
-        </p:sp>
-        <p:sp>
-          <p:nvSpPr>
-            <p:cNvPr id="246" name="tx244"/>
-            <p:cNvSpPr/>
-            <p:nvPr/>
-          </p:nvSpPr>
-          <p:spPr>
-            <a:xfrm>
-              <a:off x="7638028" y="5020223"/>
-              <a:ext cx="158245" cy="45512"/>
-            </a:xfrm>
-            <a:prstGeom prst="rect">
-              <a:avLst/>
-            </a:prstGeom>
-            <a:noFill/>
-          </p:spPr>
-          <p:txBody>
-            <a:bodyPr lIns="0" rIns="0" tIns="0" bIns="0" anchorCtr="1" anchor="ctr" wrap="none"/>
-            <a:lstStyle/>
-            <a:p>
-              <a:pPr algn="l" marL="0" marR="0" indent="0">
-                <a:lnSpc>
-                  <a:spcPts val="497"/>
-                </a:lnSpc>
-                <a:spcBef>
-                  <a:spcPts val="0"/>
-                </a:spcBef>
-                <a:spcAft>
-                  <a:spcPts val="0"/>
-                </a:spcAft>
-              </a:pPr>
-              <a:r>
-                <a:rPr sz="497">
-                  <a:solidFill>
-                    <a:srgbClr val="000000">
-                      <a:alpha val="100000"/>
-                    </a:srgbClr>
-                  </a:solidFill>
-                  <a:latin typeface="Helvetica"/>
-                  <a:cs typeface="Helvetica"/>
-                </a:rPr>
-                <a:t>0.079</a:t>
-              </a:r>
-            </a:p>
-          </p:txBody>
-        </p:sp>
-        <p:sp>
-          <p:nvSpPr>
-            <p:cNvPr id="247" name="tx245"/>
-            <p:cNvSpPr/>
-            <p:nvPr/>
-          </p:nvSpPr>
-          <p:spPr>
-            <a:xfrm>
-              <a:off x="6665558" y="3656025"/>
-              <a:ext cx="158245" cy="45605"/>
-            </a:xfrm>
-            <a:prstGeom prst="rect">
-              <a:avLst/>
-            </a:prstGeom>
-            <a:noFill/>
-          </p:spPr>
-          <p:txBody>
-            <a:bodyPr lIns="0" rIns="0" tIns="0" bIns="0" anchorCtr="1" anchor="ctr" wrap="none"/>
-            <a:lstStyle/>
-            <a:p>
-              <a:pPr algn="l" marL="0" marR="0" indent="0">
-                <a:lnSpc>
-                  <a:spcPts val="497"/>
-                </a:lnSpc>
-                <a:spcBef>
-                  <a:spcPts val="0"/>
-                </a:spcBef>
-                <a:spcAft>
-                  <a:spcPts val="0"/>
-                </a:spcAft>
-              </a:pPr>
-              <a:r>
-                <a:rPr sz="497">
-                  <a:solidFill>
-                    <a:srgbClr val="000000">
-                      <a:alpha val="100000"/>
-                    </a:srgbClr>
-                  </a:solidFill>
-                  <a:latin typeface="Helvetica"/>
-                  <a:cs typeface="Helvetica"/>
-                </a:rPr>
-                <a:t>0.160</a:t>
-              </a:r>
-            </a:p>
-          </p:txBody>
-        </p:sp>
-        <p:sp>
-          <p:nvSpPr>
-            <p:cNvPr id="248" name="tx246"/>
-            <p:cNvSpPr/>
-            <p:nvPr/>
-          </p:nvSpPr>
-          <p:spPr>
-            <a:xfrm>
-              <a:off x="8705072" y="3783879"/>
-              <a:ext cx="158245" cy="45543"/>
-            </a:xfrm>
-            <a:prstGeom prst="rect">
-              <a:avLst/>
-            </a:prstGeom>
-            <a:noFill/>
-          </p:spPr>
-          <p:txBody>
-            <a:bodyPr lIns="0" rIns="0" tIns="0" bIns="0" anchorCtr="1" anchor="ctr" wrap="none"/>
-            <a:lstStyle/>
-            <a:p>
-              <a:pPr algn="l" marL="0" marR="0" indent="0">
-                <a:lnSpc>
-                  <a:spcPts val="497"/>
-                </a:lnSpc>
-                <a:spcBef>
-                  <a:spcPts val="0"/>
-                </a:spcBef>
-                <a:spcAft>
-                  <a:spcPts val="0"/>
-                </a:spcAft>
-              </a:pPr>
-              <a:r>
-                <a:rPr sz="497">
-                  <a:solidFill>
-                    <a:srgbClr val="000000">
-                      <a:alpha val="100000"/>
-                    </a:srgbClr>
-                  </a:solidFill>
-                  <a:latin typeface="Helvetica"/>
-                  <a:cs typeface="Helvetica"/>
-                </a:rPr>
-                <a:t>0.045</a:t>
-              </a:r>
-            </a:p>
-          </p:txBody>
-        </p:sp>
-        <p:sp>
-          <p:nvSpPr>
-            <p:cNvPr id="249" name="tx247"/>
-            <p:cNvSpPr/>
-            <p:nvPr/>
-          </p:nvSpPr>
-          <p:spPr>
-            <a:xfrm>
-              <a:off x="8642270" y="3997918"/>
-              <a:ext cx="158245" cy="45481"/>
-            </a:xfrm>
-            <a:prstGeom prst="rect">
-              <a:avLst/>
-            </a:prstGeom>
-            <a:noFill/>
-          </p:spPr>
-          <p:txBody>
-            <a:bodyPr lIns="0" rIns="0" tIns="0" bIns="0" anchorCtr="1" anchor="ctr" wrap="none"/>
-            <a:lstStyle/>
-            <a:p>
-              <a:pPr algn="l" marL="0" marR="0" indent="0">
-                <a:lnSpc>
-                  <a:spcPts val="497"/>
-                </a:lnSpc>
-                <a:spcBef>
-                  <a:spcPts val="0"/>
-                </a:spcBef>
-                <a:spcAft>
-                  <a:spcPts val="0"/>
-                </a:spcAft>
-              </a:pPr>
-              <a:r>
-                <a:rPr sz="497">
-                  <a:solidFill>
-                    <a:srgbClr val="000000">
-                      <a:alpha val="100000"/>
-                    </a:srgbClr>
-                  </a:solidFill>
-                  <a:latin typeface="Helvetica"/>
-                  <a:cs typeface="Helvetica"/>
-                </a:rPr>
-                <a:t>0.037</a:t>
-              </a:r>
-            </a:p>
-          </p:txBody>
-        </p:sp>
-        <p:sp>
-          <p:nvSpPr>
-            <p:cNvPr id="250" name="tx248"/>
-            <p:cNvSpPr/>
-            <p:nvPr/>
-          </p:nvSpPr>
-          <p:spPr>
-            <a:xfrm>
-              <a:off x="5714980" y="3043844"/>
-              <a:ext cx="158245" cy="45574"/>
-            </a:xfrm>
-            <a:prstGeom prst="rect">
-              <a:avLst/>
-            </a:prstGeom>
-            <a:noFill/>
-          </p:spPr>
-          <p:txBody>
-            <a:bodyPr lIns="0" rIns="0" tIns="0" bIns="0" anchorCtr="1" anchor="ctr" wrap="none"/>
-            <a:lstStyle/>
-            <a:p>
-              <a:pPr algn="l" marL="0" marR="0" indent="0">
-                <a:lnSpc>
-                  <a:spcPts val="497"/>
-                </a:lnSpc>
-                <a:spcBef>
-                  <a:spcPts val="0"/>
-                </a:spcBef>
-                <a:spcAft>
-                  <a:spcPts val="0"/>
-                </a:spcAft>
-              </a:pPr>
-              <a:r>
-                <a:rPr sz="497">
-                  <a:solidFill>
-                    <a:srgbClr val="000000">
-                      <a:alpha val="100000"/>
-                    </a:srgbClr>
-                  </a:solidFill>
-                  <a:latin typeface="Helvetica"/>
-                  <a:cs typeface="Helvetica"/>
-                </a:rPr>
-                <a:t>0.032</a:t>
-              </a:r>
-            </a:p>
-          </p:txBody>
-        </p:sp>
-        <p:sp>
-          <p:nvSpPr>
-            <p:cNvPr id="251" name="tx249"/>
-            <p:cNvSpPr/>
-            <p:nvPr/>
-          </p:nvSpPr>
-          <p:spPr>
-            <a:xfrm>
-              <a:off x="6672165" y="3403599"/>
-              <a:ext cx="158245" cy="45420"/>
-            </a:xfrm>
-            <a:prstGeom prst="rect">
-              <a:avLst/>
-            </a:prstGeom>
-            <a:noFill/>
-          </p:spPr>
-          <p:txBody>
-            <a:bodyPr lIns="0" rIns="0" tIns="0" bIns="0" anchorCtr="1" anchor="ctr" wrap="none"/>
-            <a:lstStyle/>
-            <a:p>
-              <a:pPr algn="l" marL="0" marR="0" indent="0">
-                <a:lnSpc>
-                  <a:spcPts val="497"/>
-                </a:lnSpc>
-                <a:spcBef>
-                  <a:spcPts val="0"/>
-                </a:spcBef>
-                <a:spcAft>
-                  <a:spcPts val="0"/>
-                </a:spcAft>
-              </a:pPr>
-              <a:r>
-                <a:rPr sz="497">
-                  <a:solidFill>
-                    <a:srgbClr val="000000">
-                      <a:alpha val="100000"/>
-                    </a:srgbClr>
-                  </a:solidFill>
-                  <a:latin typeface="Helvetica"/>
-                  <a:cs typeface="Helvetica"/>
-                </a:rPr>
-                <a:t>0.051</a:t>
-              </a:r>
-            </a:p>
-          </p:txBody>
-        </p:sp>
-        <p:sp>
-          <p:nvSpPr>
-            <p:cNvPr id="252" name="tx250"/>
-            <p:cNvSpPr/>
-            <p:nvPr/>
-          </p:nvSpPr>
-          <p:spPr>
-            <a:xfrm>
               <a:off x="3632492" y="2403865"/>
               <a:ext cx="207370" cy="46593"/>
             </a:xfrm>
@@ -13804,7 +12056,7 @@
         </p:sp>
         <p:sp>
           <p:nvSpPr>
-            <p:cNvPr id="253" name="tx251"/>
+            <p:cNvPr id="215" name="tx213"/>
             <p:cNvSpPr/>
             <p:nvPr/>
           </p:nvSpPr>
@@ -13850,7 +12102,7 @@
         </p:sp>
         <p:sp>
           <p:nvSpPr>
-            <p:cNvPr id="254" name="tx252"/>
+            <p:cNvPr id="216" name="tx214"/>
             <p:cNvSpPr/>
             <p:nvPr/>
           </p:nvSpPr>
@@ -13896,7 +12148,7 @@
         </p:sp>
         <p:sp>
           <p:nvSpPr>
-            <p:cNvPr id="255" name="tx253"/>
+            <p:cNvPr id="217" name="tx215"/>
             <p:cNvSpPr/>
             <p:nvPr/>
           </p:nvSpPr>
@@ -13942,7 +12194,7 @@
         </p:sp>
         <p:sp>
           <p:nvSpPr>
-            <p:cNvPr id="256" name="tx254"/>
+            <p:cNvPr id="218" name="tx216"/>
             <p:cNvSpPr/>
             <p:nvPr/>
           </p:nvSpPr>
@@ -13988,7 +12240,7 @@
         </p:sp>
         <p:sp>
           <p:nvSpPr>
-            <p:cNvPr id="257" name="tx255"/>
+            <p:cNvPr id="219" name="tx217"/>
             <p:cNvSpPr/>
             <p:nvPr/>
           </p:nvSpPr>
@@ -14034,7 +12286,7 @@
         </p:sp>
         <p:sp>
           <p:nvSpPr>
-            <p:cNvPr id="258" name="tx256"/>
+            <p:cNvPr id="220" name="tx218"/>
             <p:cNvSpPr/>
             <p:nvPr/>
           </p:nvSpPr>
@@ -14080,7 +12332,7 @@
         </p:sp>
         <p:sp>
           <p:nvSpPr>
-            <p:cNvPr id="259" name="tx257"/>
+            <p:cNvPr id="221" name="tx219"/>
             <p:cNvSpPr/>
             <p:nvPr/>
           </p:nvSpPr>
@@ -14126,7 +12378,7 @@
         </p:sp>
         <p:sp>
           <p:nvSpPr>
-            <p:cNvPr id="260" name="pl258"/>
+            <p:cNvPr id="222" name="pl220"/>
             <p:cNvSpPr/>
             <p:nvPr/>
           </p:nvSpPr>
@@ -14166,7 +12418,7 @@
         </p:sp>
         <p:sp>
           <p:nvSpPr>
-            <p:cNvPr id="261" name="pl259"/>
+            <p:cNvPr id="223" name="pl221"/>
             <p:cNvSpPr/>
             <p:nvPr/>
           </p:nvSpPr>
@@ -14206,7 +12458,7 @@
         </p:sp>
         <p:sp>
           <p:nvSpPr>
-            <p:cNvPr id="262" name="pl260"/>
+            <p:cNvPr id="224" name="pl222"/>
             <p:cNvSpPr/>
             <p:nvPr/>
           </p:nvSpPr>
@@ -14246,7 +12498,7 @@
         </p:sp>
         <p:sp>
           <p:nvSpPr>
-            <p:cNvPr id="263" name="pl261"/>
+            <p:cNvPr id="225" name="pl223"/>
             <p:cNvSpPr/>
             <p:nvPr/>
           </p:nvSpPr>
@@ -14286,7 +12538,7 @@
         </p:sp>
         <p:sp>
           <p:nvSpPr>
-            <p:cNvPr id="264" name="pl262"/>
+            <p:cNvPr id="226" name="pl224"/>
             <p:cNvSpPr/>
             <p:nvPr/>
           </p:nvSpPr>
@@ -14326,7 +12578,7 @@
         </p:sp>
         <p:sp>
           <p:nvSpPr>
-            <p:cNvPr id="265" name="tx263"/>
+            <p:cNvPr id="227" name="tx225"/>
             <p:cNvSpPr/>
             <p:nvPr/>
           </p:nvSpPr>
@@ -14372,7 +12624,7 @@
         </p:sp>
         <p:sp>
           <p:nvSpPr>
-            <p:cNvPr id="266" name="tx264"/>
+            <p:cNvPr id="228" name="tx226"/>
             <p:cNvSpPr/>
             <p:nvPr/>
           </p:nvSpPr>
@@ -14418,7 +12670,7 @@
         </p:sp>
         <p:sp>
           <p:nvSpPr>
-            <p:cNvPr id="267" name="tx265"/>
+            <p:cNvPr id="229" name="tx227"/>
             <p:cNvSpPr/>
             <p:nvPr/>
           </p:nvSpPr>
@@ -14464,7 +12716,7 @@
         </p:sp>
         <p:sp>
           <p:nvSpPr>
-            <p:cNvPr id="268" name="tx266"/>
+            <p:cNvPr id="230" name="tx228"/>
             <p:cNvSpPr/>
             <p:nvPr/>
           </p:nvSpPr>

</xml_diff>